<commit_message>
final commit before exam
</commit_message>
<xml_diff>
--- a/Presentations/10_Web.pptx
+++ b/Presentations/10_Web.pptx
@@ -3556,7 +3556,7 @@
           <a:p>
             <a:fld id="{062B8C5F-8AC5-4E7D-8456-DDA4B987C3A3}" type="datetimeFigureOut">
               <a:rPr lang="en-US" smtClean="0"/>
-              <a:t>8/17/2020</a:t>
+              <a:t>8/18/2020</a:t>
             </a:fld>
             <a:endParaRPr lang="en-US"/>
           </a:p>
@@ -3756,7 +3756,7 @@
           <a:p>
             <a:fld id="{062B8C5F-8AC5-4E7D-8456-DDA4B987C3A3}" type="datetimeFigureOut">
               <a:rPr lang="en-US" smtClean="0"/>
-              <a:t>8/17/2020</a:t>
+              <a:t>8/18/2020</a:t>
             </a:fld>
             <a:endParaRPr lang="en-US"/>
           </a:p>
@@ -3966,7 +3966,7 @@
           <a:p>
             <a:fld id="{062B8C5F-8AC5-4E7D-8456-DDA4B987C3A3}" type="datetimeFigureOut">
               <a:rPr lang="en-US" smtClean="0"/>
-              <a:t>8/17/2020</a:t>
+              <a:t>8/18/2020</a:t>
             </a:fld>
             <a:endParaRPr lang="en-US"/>
           </a:p>
@@ -4166,7 +4166,7 @@
           <a:p>
             <a:fld id="{062B8C5F-8AC5-4E7D-8456-DDA4B987C3A3}" type="datetimeFigureOut">
               <a:rPr lang="en-US" smtClean="0"/>
-              <a:t>8/17/2020</a:t>
+              <a:t>8/18/2020</a:t>
             </a:fld>
             <a:endParaRPr lang="en-US"/>
           </a:p>
@@ -4442,7 +4442,7 @@
           <a:p>
             <a:fld id="{062B8C5F-8AC5-4E7D-8456-DDA4B987C3A3}" type="datetimeFigureOut">
               <a:rPr lang="en-US" smtClean="0"/>
-              <a:t>8/17/2020</a:t>
+              <a:t>8/18/2020</a:t>
             </a:fld>
             <a:endParaRPr lang="en-US"/>
           </a:p>
@@ -4710,7 +4710,7 @@
           <a:p>
             <a:fld id="{062B8C5F-8AC5-4E7D-8456-DDA4B987C3A3}" type="datetimeFigureOut">
               <a:rPr lang="en-US" smtClean="0"/>
-              <a:t>8/17/2020</a:t>
+              <a:t>8/18/2020</a:t>
             </a:fld>
             <a:endParaRPr lang="en-US"/>
           </a:p>
@@ -5125,7 +5125,7 @@
           <a:p>
             <a:fld id="{062B8C5F-8AC5-4E7D-8456-DDA4B987C3A3}" type="datetimeFigureOut">
               <a:rPr lang="en-US" smtClean="0"/>
-              <a:t>8/17/2020</a:t>
+              <a:t>8/18/2020</a:t>
             </a:fld>
             <a:endParaRPr lang="en-US"/>
           </a:p>
@@ -5267,7 +5267,7 @@
           <a:p>
             <a:fld id="{062B8C5F-8AC5-4E7D-8456-DDA4B987C3A3}" type="datetimeFigureOut">
               <a:rPr lang="en-US" smtClean="0"/>
-              <a:t>8/17/2020</a:t>
+              <a:t>8/18/2020</a:t>
             </a:fld>
             <a:endParaRPr lang="en-US"/>
           </a:p>
@@ -5380,7 +5380,7 @@
           <a:p>
             <a:fld id="{062B8C5F-8AC5-4E7D-8456-DDA4B987C3A3}" type="datetimeFigureOut">
               <a:rPr lang="en-US" smtClean="0"/>
-              <a:t>8/17/2020</a:t>
+              <a:t>8/18/2020</a:t>
             </a:fld>
             <a:endParaRPr lang="en-US"/>
           </a:p>
@@ -5693,7 +5693,7 @@
           <a:p>
             <a:fld id="{062B8C5F-8AC5-4E7D-8456-DDA4B987C3A3}" type="datetimeFigureOut">
               <a:rPr lang="en-US" smtClean="0"/>
-              <a:t>8/17/2020</a:t>
+              <a:t>8/18/2020</a:t>
             </a:fld>
             <a:endParaRPr lang="en-US"/>
           </a:p>
@@ -5982,7 +5982,7 @@
           <a:p>
             <a:fld id="{062B8C5F-8AC5-4E7D-8456-DDA4B987C3A3}" type="datetimeFigureOut">
               <a:rPr lang="en-US" smtClean="0"/>
-              <a:t>8/17/2020</a:t>
+              <a:t>8/18/2020</a:t>
             </a:fld>
             <a:endParaRPr lang="en-US"/>
           </a:p>
@@ -6225,7 +6225,7 @@
           <a:p>
             <a:fld id="{062B8C5F-8AC5-4E7D-8456-DDA4B987C3A3}" type="datetimeFigureOut">
               <a:rPr lang="en-US" smtClean="0"/>
-              <a:t>8/17/2020</a:t>
+              <a:t>8/18/2020</a:t>
             </a:fld>
             <a:endParaRPr lang="en-US"/>
           </a:p>
@@ -7352,6 +7352,264 @@
           <a:p>
             <a:pPr algn="ctr"/>
             <a:endParaRPr lang="en-US"/>
+          </a:p>
+        </p:txBody>
+      </p:sp>
+      <p:sp>
+        <p:nvSpPr>
+          <p:cNvPr id="4" name="Tekstfelt 3">
+            <a:extLst>
+              <a:ext uri="{FF2B5EF4-FFF2-40B4-BE49-F238E27FC236}">
+                <a16:creationId xmlns:a16="http://schemas.microsoft.com/office/drawing/2014/main" id="{CDBB5A4D-1445-4C68-B76A-1EE35ADB3BEF}"/>
+              </a:ext>
+            </a:extLst>
+          </p:cNvPr>
+          <p:cNvSpPr txBox="1"/>
+          <p:nvPr/>
+        </p:nvSpPr>
+        <p:spPr>
+          <a:xfrm>
+            <a:off x="8864990" y="451365"/>
+            <a:ext cx="1884106" cy="369332"/>
+          </a:xfrm>
+          <a:prstGeom prst="rect">
+            <a:avLst/>
+          </a:prstGeom>
+          <a:noFill/>
+        </p:spPr>
+        <p:txBody>
+          <a:bodyPr wrap="none" rtlCol="0">
+            <a:spAutoFit/>
+          </a:bodyPr>
+          <a:lstStyle>
+            <a:defPPr>
+              <a:defRPr lang="da-DK"/>
+            </a:defPPr>
+            <a:lvl1pPr marL="0" algn="l" defTabSz="914400" rtl="0" eaLnBrk="1" latinLnBrk="0" hangingPunct="1">
+              <a:defRPr sz="1800" kern="1200">
+                <a:solidFill>
+                  <a:schemeClr val="tx1"/>
+                </a:solidFill>
+                <a:latin typeface="+mn-lt"/>
+                <a:ea typeface="+mn-ea"/>
+                <a:cs typeface="+mn-cs"/>
+              </a:defRPr>
+            </a:lvl1pPr>
+            <a:lvl2pPr marL="457200" algn="l" defTabSz="914400" rtl="0" eaLnBrk="1" latinLnBrk="0" hangingPunct="1">
+              <a:defRPr sz="1800" kern="1200">
+                <a:solidFill>
+                  <a:schemeClr val="tx1"/>
+                </a:solidFill>
+                <a:latin typeface="+mn-lt"/>
+                <a:ea typeface="+mn-ea"/>
+                <a:cs typeface="+mn-cs"/>
+              </a:defRPr>
+            </a:lvl2pPr>
+            <a:lvl3pPr marL="914400" algn="l" defTabSz="914400" rtl="0" eaLnBrk="1" latinLnBrk="0" hangingPunct="1">
+              <a:defRPr sz="1800" kern="1200">
+                <a:solidFill>
+                  <a:schemeClr val="tx1"/>
+                </a:solidFill>
+                <a:latin typeface="+mn-lt"/>
+                <a:ea typeface="+mn-ea"/>
+                <a:cs typeface="+mn-cs"/>
+              </a:defRPr>
+            </a:lvl3pPr>
+            <a:lvl4pPr marL="1371600" algn="l" defTabSz="914400" rtl="0" eaLnBrk="1" latinLnBrk="0" hangingPunct="1">
+              <a:defRPr sz="1800" kern="1200">
+                <a:solidFill>
+                  <a:schemeClr val="tx1"/>
+                </a:solidFill>
+                <a:latin typeface="+mn-lt"/>
+                <a:ea typeface="+mn-ea"/>
+                <a:cs typeface="+mn-cs"/>
+              </a:defRPr>
+            </a:lvl4pPr>
+            <a:lvl5pPr marL="1828800" algn="l" defTabSz="914400" rtl="0" eaLnBrk="1" latinLnBrk="0" hangingPunct="1">
+              <a:defRPr sz="1800" kern="1200">
+                <a:solidFill>
+                  <a:schemeClr val="tx1"/>
+                </a:solidFill>
+                <a:latin typeface="+mn-lt"/>
+                <a:ea typeface="+mn-ea"/>
+                <a:cs typeface="+mn-cs"/>
+              </a:defRPr>
+            </a:lvl5pPr>
+            <a:lvl6pPr marL="2286000" algn="l" defTabSz="914400" rtl="0" eaLnBrk="1" latinLnBrk="0" hangingPunct="1">
+              <a:defRPr sz="1800" kern="1200">
+                <a:solidFill>
+                  <a:schemeClr val="tx1"/>
+                </a:solidFill>
+                <a:latin typeface="+mn-lt"/>
+                <a:ea typeface="+mn-ea"/>
+                <a:cs typeface="+mn-cs"/>
+              </a:defRPr>
+            </a:lvl6pPr>
+            <a:lvl7pPr marL="2743200" algn="l" defTabSz="914400" rtl="0" eaLnBrk="1" latinLnBrk="0" hangingPunct="1">
+              <a:defRPr sz="1800" kern="1200">
+                <a:solidFill>
+                  <a:schemeClr val="tx1"/>
+                </a:solidFill>
+                <a:latin typeface="+mn-lt"/>
+                <a:ea typeface="+mn-ea"/>
+                <a:cs typeface="+mn-cs"/>
+              </a:defRPr>
+            </a:lvl7pPr>
+            <a:lvl8pPr marL="3200400" algn="l" defTabSz="914400" rtl="0" eaLnBrk="1" latinLnBrk="0" hangingPunct="1">
+              <a:defRPr sz="1800" kern="1200">
+                <a:solidFill>
+                  <a:schemeClr val="tx1"/>
+                </a:solidFill>
+                <a:latin typeface="+mn-lt"/>
+                <a:ea typeface="+mn-ea"/>
+                <a:cs typeface="+mn-cs"/>
+              </a:defRPr>
+            </a:lvl8pPr>
+            <a:lvl9pPr marL="3657600" algn="l" defTabSz="914400" rtl="0" eaLnBrk="1" latinLnBrk="0" hangingPunct="1">
+              <a:defRPr sz="1800" kern="1200">
+                <a:solidFill>
+                  <a:schemeClr val="tx1"/>
+                </a:solidFill>
+                <a:latin typeface="+mn-lt"/>
+                <a:ea typeface="+mn-ea"/>
+                <a:cs typeface="+mn-cs"/>
+              </a:defRPr>
+            </a:lvl9pPr>
+          </a:lstStyle>
+          <a:p>
+            <a:r>
+              <a:rPr lang="da-DK" dirty="0"/>
+              <a:t>Andreas Blaabjerg</a:t>
+            </a:r>
+          </a:p>
+        </p:txBody>
+      </p:sp>
+      <p:sp>
+        <p:nvSpPr>
+          <p:cNvPr id="5" name="Tekstfelt 4">
+            <a:extLst>
+              <a:ext uri="{FF2B5EF4-FFF2-40B4-BE49-F238E27FC236}">
+                <a16:creationId xmlns:a16="http://schemas.microsoft.com/office/drawing/2014/main" id="{A4178C45-BF5C-4720-BEFF-FFEB11761EE0}"/>
+              </a:ext>
+            </a:extLst>
+          </p:cNvPr>
+          <p:cNvSpPr txBox="1"/>
+          <p:nvPr/>
+        </p:nvSpPr>
+        <p:spPr>
+          <a:xfrm>
+            <a:off x="9807043" y="849095"/>
+            <a:ext cx="1237839" cy="369332"/>
+          </a:xfrm>
+          <a:prstGeom prst="rect">
+            <a:avLst/>
+          </a:prstGeom>
+          <a:noFill/>
+        </p:spPr>
+        <p:txBody>
+          <a:bodyPr wrap="none" rtlCol="0">
+            <a:spAutoFit/>
+          </a:bodyPr>
+          <a:lstStyle>
+            <a:defPPr>
+              <a:defRPr lang="da-DK"/>
+            </a:defPPr>
+            <a:lvl1pPr marL="0" algn="l" defTabSz="914400" rtl="0" eaLnBrk="1" latinLnBrk="0" hangingPunct="1">
+              <a:defRPr sz="1800" kern="1200">
+                <a:solidFill>
+                  <a:schemeClr val="tx1"/>
+                </a:solidFill>
+                <a:latin typeface="+mn-lt"/>
+                <a:ea typeface="+mn-ea"/>
+                <a:cs typeface="+mn-cs"/>
+              </a:defRPr>
+            </a:lvl1pPr>
+            <a:lvl2pPr marL="457200" algn="l" defTabSz="914400" rtl="0" eaLnBrk="1" latinLnBrk="0" hangingPunct="1">
+              <a:defRPr sz="1800" kern="1200">
+                <a:solidFill>
+                  <a:schemeClr val="tx1"/>
+                </a:solidFill>
+                <a:latin typeface="+mn-lt"/>
+                <a:ea typeface="+mn-ea"/>
+                <a:cs typeface="+mn-cs"/>
+              </a:defRPr>
+            </a:lvl2pPr>
+            <a:lvl3pPr marL="914400" algn="l" defTabSz="914400" rtl="0" eaLnBrk="1" latinLnBrk="0" hangingPunct="1">
+              <a:defRPr sz="1800" kern="1200">
+                <a:solidFill>
+                  <a:schemeClr val="tx1"/>
+                </a:solidFill>
+                <a:latin typeface="+mn-lt"/>
+                <a:ea typeface="+mn-ea"/>
+                <a:cs typeface="+mn-cs"/>
+              </a:defRPr>
+            </a:lvl3pPr>
+            <a:lvl4pPr marL="1371600" algn="l" defTabSz="914400" rtl="0" eaLnBrk="1" latinLnBrk="0" hangingPunct="1">
+              <a:defRPr sz="1800" kern="1200">
+                <a:solidFill>
+                  <a:schemeClr val="tx1"/>
+                </a:solidFill>
+                <a:latin typeface="+mn-lt"/>
+                <a:ea typeface="+mn-ea"/>
+                <a:cs typeface="+mn-cs"/>
+              </a:defRPr>
+            </a:lvl4pPr>
+            <a:lvl5pPr marL="1828800" algn="l" defTabSz="914400" rtl="0" eaLnBrk="1" latinLnBrk="0" hangingPunct="1">
+              <a:defRPr sz="1800" kern="1200">
+                <a:solidFill>
+                  <a:schemeClr val="tx1"/>
+                </a:solidFill>
+                <a:latin typeface="+mn-lt"/>
+                <a:ea typeface="+mn-ea"/>
+                <a:cs typeface="+mn-cs"/>
+              </a:defRPr>
+            </a:lvl5pPr>
+            <a:lvl6pPr marL="2286000" algn="l" defTabSz="914400" rtl="0" eaLnBrk="1" latinLnBrk="0" hangingPunct="1">
+              <a:defRPr sz="1800" kern="1200">
+                <a:solidFill>
+                  <a:schemeClr val="tx1"/>
+                </a:solidFill>
+                <a:latin typeface="+mn-lt"/>
+                <a:ea typeface="+mn-ea"/>
+                <a:cs typeface="+mn-cs"/>
+              </a:defRPr>
+            </a:lvl6pPr>
+            <a:lvl7pPr marL="2743200" algn="l" defTabSz="914400" rtl="0" eaLnBrk="1" latinLnBrk="0" hangingPunct="1">
+              <a:defRPr sz="1800" kern="1200">
+                <a:solidFill>
+                  <a:schemeClr val="tx1"/>
+                </a:solidFill>
+                <a:latin typeface="+mn-lt"/>
+                <a:ea typeface="+mn-ea"/>
+                <a:cs typeface="+mn-cs"/>
+              </a:defRPr>
+            </a:lvl7pPr>
+            <a:lvl8pPr marL="3200400" algn="l" defTabSz="914400" rtl="0" eaLnBrk="1" latinLnBrk="0" hangingPunct="1">
+              <a:defRPr sz="1800" kern="1200">
+                <a:solidFill>
+                  <a:schemeClr val="tx1"/>
+                </a:solidFill>
+                <a:latin typeface="+mn-lt"/>
+                <a:ea typeface="+mn-ea"/>
+                <a:cs typeface="+mn-cs"/>
+              </a:defRPr>
+            </a:lvl8pPr>
+            <a:lvl9pPr marL="3657600" algn="l" defTabSz="914400" rtl="0" eaLnBrk="1" latinLnBrk="0" hangingPunct="1">
+              <a:defRPr sz="1800" kern="1200">
+                <a:solidFill>
+                  <a:schemeClr val="tx1"/>
+                </a:solidFill>
+                <a:latin typeface="+mn-lt"/>
+                <a:ea typeface="+mn-ea"/>
+                <a:cs typeface="+mn-cs"/>
+              </a:defRPr>
+            </a:lvl9pPr>
+          </a:lstStyle>
+          <a:p>
+            <a:r>
+              <a:rPr lang="da-DK" dirty="0"/>
+              <a:t>201510924</a:t>
+            </a:r>
           </a:p>
         </p:txBody>
       </p:sp>

</xml_diff>